<commit_message>
ppt og pdf af kynningu
</commit_message>
<xml_diff>
--- a/8Hkynning.pptx
+++ b/8Hkynning.pptx
@@ -108,6 +108,11 @@
       </a:defRPr>
     </a:lvl9pPr>
   </p:defaultTextStyle>
+  <p:extLst>
+    <p:ext uri="{EFAFB233-063F-42B5-8137-9DF3F51BA10A}">
+      <p15:sldGuideLst xmlns:p15="http://schemas.microsoft.com/office/powerpoint/2012/main"/>
+    </p:ext>
+  </p:extLst>
 </p:presentation>
 </file>
 
@@ -193,7 +198,7 @@
           <a:p>
             <a:fld id="{72356B8B-AA88-439A-95AD-FBA59DEDBC6A}" type="datetimeFigureOut">
               <a:rPr lang="is-IS" smtClean="0"/>
-              <a:t>8.4.2019</a:t>
+              <a:t>10.4.2019</a:t>
             </a:fld>
             <a:endParaRPr lang="is-IS"/>
           </a:p>
@@ -697,7 +702,7 @@
           <a:p>
             <a:fld id="{F380CAF7-4E59-4242-AABC-576DC4C4C85E}" type="datetimeFigureOut">
               <a:rPr lang="is-IS" smtClean="0"/>
-              <a:t>8.4.2019</a:t>
+              <a:t>10.4.2019</a:t>
             </a:fld>
             <a:endParaRPr lang="is-IS"/>
           </a:p>
@@ -897,7 +902,7 @@
           <a:p>
             <a:fld id="{F380CAF7-4E59-4242-AABC-576DC4C4C85E}" type="datetimeFigureOut">
               <a:rPr lang="is-IS" smtClean="0"/>
-              <a:t>8.4.2019</a:t>
+              <a:t>10.4.2019</a:t>
             </a:fld>
             <a:endParaRPr lang="is-IS"/>
           </a:p>
@@ -1107,7 +1112,7 @@
           <a:p>
             <a:fld id="{F380CAF7-4E59-4242-AABC-576DC4C4C85E}" type="datetimeFigureOut">
               <a:rPr lang="is-IS" smtClean="0"/>
-              <a:t>8.4.2019</a:t>
+              <a:t>10.4.2019</a:t>
             </a:fld>
             <a:endParaRPr lang="is-IS"/>
           </a:p>
@@ -1307,7 +1312,7 @@
           <a:p>
             <a:fld id="{F380CAF7-4E59-4242-AABC-576DC4C4C85E}" type="datetimeFigureOut">
               <a:rPr lang="is-IS" smtClean="0"/>
-              <a:t>8.4.2019</a:t>
+              <a:t>10.4.2019</a:t>
             </a:fld>
             <a:endParaRPr lang="is-IS"/>
           </a:p>
@@ -1583,7 +1588,7 @@
           <a:p>
             <a:fld id="{F380CAF7-4E59-4242-AABC-576DC4C4C85E}" type="datetimeFigureOut">
               <a:rPr lang="is-IS" smtClean="0"/>
-              <a:t>8.4.2019</a:t>
+              <a:t>10.4.2019</a:t>
             </a:fld>
             <a:endParaRPr lang="is-IS"/>
           </a:p>
@@ -1851,7 +1856,7 @@
           <a:p>
             <a:fld id="{F380CAF7-4E59-4242-AABC-576DC4C4C85E}" type="datetimeFigureOut">
               <a:rPr lang="is-IS" smtClean="0"/>
-              <a:t>8.4.2019</a:t>
+              <a:t>10.4.2019</a:t>
             </a:fld>
             <a:endParaRPr lang="is-IS"/>
           </a:p>
@@ -2266,7 +2271,7 @@
           <a:p>
             <a:fld id="{F380CAF7-4E59-4242-AABC-576DC4C4C85E}" type="datetimeFigureOut">
               <a:rPr lang="is-IS" smtClean="0"/>
-              <a:t>8.4.2019</a:t>
+              <a:t>10.4.2019</a:t>
             </a:fld>
             <a:endParaRPr lang="is-IS"/>
           </a:p>
@@ -2408,7 +2413,7 @@
           <a:p>
             <a:fld id="{F380CAF7-4E59-4242-AABC-576DC4C4C85E}" type="datetimeFigureOut">
               <a:rPr lang="is-IS" smtClean="0"/>
-              <a:t>8.4.2019</a:t>
+              <a:t>10.4.2019</a:t>
             </a:fld>
             <a:endParaRPr lang="is-IS"/>
           </a:p>
@@ -2521,7 +2526,7 @@
           <a:p>
             <a:fld id="{F380CAF7-4E59-4242-AABC-576DC4C4C85E}" type="datetimeFigureOut">
               <a:rPr lang="is-IS" smtClean="0"/>
-              <a:t>8.4.2019</a:t>
+              <a:t>10.4.2019</a:t>
             </a:fld>
             <a:endParaRPr lang="is-IS"/>
           </a:p>
@@ -2834,7 +2839,7 @@
           <a:p>
             <a:fld id="{F380CAF7-4E59-4242-AABC-576DC4C4C85E}" type="datetimeFigureOut">
               <a:rPr lang="is-IS" smtClean="0"/>
-              <a:t>8.4.2019</a:t>
+              <a:t>10.4.2019</a:t>
             </a:fld>
             <a:endParaRPr lang="is-IS"/>
           </a:p>
@@ -3123,7 +3128,7 @@
           <a:p>
             <a:fld id="{F380CAF7-4E59-4242-AABC-576DC4C4C85E}" type="datetimeFigureOut">
               <a:rPr lang="is-IS" smtClean="0"/>
-              <a:t>8.4.2019</a:t>
+              <a:t>10.4.2019</a:t>
             </a:fld>
             <a:endParaRPr lang="is-IS"/>
           </a:p>
@@ -3366,7 +3371,7 @@
           <a:p>
             <a:fld id="{F380CAF7-4E59-4242-AABC-576DC4C4C85E}" type="datetimeFigureOut">
               <a:rPr lang="is-IS" smtClean="0"/>
-              <a:t>8.4.2019</a:t>
+              <a:t>10.4.2019</a:t>
             </a:fld>
             <a:endParaRPr lang="is-IS"/>
           </a:p>
@@ -4079,7 +4084,7 @@
             <a:pPr lvl="1"/>
             <a:r>
               <a:rPr lang="is-IS" dirty="0"/>
-              <a:t>Ordering and sorting using SQL</a:t>
+              <a:t>Filtering and sorting using SQL</a:t>
             </a:r>
           </a:p>
           <a:p>

</xml_diff>